<commit_message>
korhaz adat gomb hazzadas
</commit_message>
<xml_diff>
--- a/Minta/szinosszeallitasok.pptx
+++ b/Minta/szinosszeallitasok.pptx
@@ -5886,7 +5886,7 @@
           <p:nvPr/>
         </p:nvPicPr>
         <p:blipFill>
-          <a:blip r:embed="rId11">
+          <a:blip r:embed="rId11" cstate="hqprint">
             <a:extLst>
               <a:ext uri="{28A0092B-C50C-407E-A947-70E740481C1C}">
                 <a14:useLocalDpi xmlns:a14="http://schemas.microsoft.com/office/drawing/2010/main" val="0"/>
@@ -5907,6 +5907,72 @@
           </a:prstGeom>
         </p:spPr>
       </p:pic>
+      <p:sp>
+        <p:nvSpPr>
+          <p:cNvPr id="27" name="Téglalap: lekerekített 6">
+            <a:extLst>
+              <a:ext uri="{FF2B5EF4-FFF2-40B4-BE49-F238E27FC236}">
+                <a16:creationId xmlns:a16="http://schemas.microsoft.com/office/drawing/2014/main" id="{1D2B0348-42C5-4CAC-ADE0-3D07B740285F}"/>
+              </a:ext>
+            </a:extLst>
+          </p:cNvPr>
+          <p:cNvSpPr/>
+          <p:nvPr/>
+        </p:nvSpPr>
+        <p:spPr>
+          <a:xfrm>
+            <a:off x="5618632" y="134938"/>
+            <a:ext cx="2192781" cy="378365"/>
+          </a:xfrm>
+          <a:prstGeom prst="roundRect">
+            <a:avLst/>
+          </a:prstGeom>
+          <a:solidFill>
+            <a:schemeClr val="tx1"/>
+          </a:solidFill>
+          <a:ln w="3175">
+            <a:noFill/>
+          </a:ln>
+        </p:spPr>
+        <p:style>
+          <a:lnRef idx="2">
+            <a:schemeClr val="accent1">
+              <a:shade val="50000"/>
+            </a:schemeClr>
+          </a:lnRef>
+          <a:fillRef idx="1">
+            <a:schemeClr val="accent1"/>
+          </a:fillRef>
+          <a:effectRef idx="0">
+            <a:schemeClr val="accent1"/>
+          </a:effectRef>
+          <a:fontRef idx="minor">
+            <a:schemeClr val="lt1"/>
+          </a:fontRef>
+        </p:style>
+        <p:txBody>
+          <a:bodyPr rtlCol="0" anchor="ctr"/>
+          <a:lstStyle/>
+          <a:p>
+            <a:pPr algn="ctr"/>
+            <a:r>
+              <a:rPr lang="hu-HU" sz="1600" dirty="0" smtClean="0">
+                <a:solidFill>
+                  <a:schemeClr val="bg1"/>
+                </a:solidFill>
+                <a:latin typeface="Corbel" panose="020B0503020204020204" pitchFamily="34" charset="0"/>
+              </a:rPr>
+              <a:t>Kórház adatok</a:t>
+            </a:r>
+            <a:endParaRPr lang="en-US" sz="1600" dirty="0">
+              <a:solidFill>
+                <a:schemeClr val="bg1"/>
+              </a:solidFill>
+              <a:latin typeface="Corbel" panose="020B0503020204020204" pitchFamily="34" charset="0"/>
+            </a:endParaRPr>
+          </a:p>
+        </p:txBody>
+      </p:sp>
     </p:spTree>
     <p:extLst>
       <p:ext uri="{BB962C8B-B14F-4D97-AF65-F5344CB8AC3E}">
@@ -8483,7 +8549,7 @@
           <p:nvPr/>
         </p:nvPicPr>
         <p:blipFill>
-          <a:blip r:embed="rId11">
+          <a:blip r:embed="rId11" cstate="hqprint">
             <a:extLst>
               <a:ext uri="{28A0092B-C50C-407E-A947-70E740481C1C}">
                 <a14:useLocalDpi xmlns:a14="http://schemas.microsoft.com/office/drawing/2010/main" val="0"/>
@@ -8504,6 +8570,72 @@
           </a:prstGeom>
         </p:spPr>
       </p:pic>
+      <p:sp>
+        <p:nvSpPr>
+          <p:cNvPr id="25" name="Téglalap: lekerekített 6">
+            <a:extLst>
+              <a:ext uri="{FF2B5EF4-FFF2-40B4-BE49-F238E27FC236}">
+                <a16:creationId xmlns:a16="http://schemas.microsoft.com/office/drawing/2014/main" id="{1D2B0348-42C5-4CAC-ADE0-3D07B740285F}"/>
+              </a:ext>
+            </a:extLst>
+          </p:cNvPr>
+          <p:cNvSpPr/>
+          <p:nvPr/>
+        </p:nvSpPr>
+        <p:spPr>
+          <a:xfrm>
+            <a:off x="5618632" y="134938"/>
+            <a:ext cx="2192781" cy="378365"/>
+          </a:xfrm>
+          <a:prstGeom prst="roundRect">
+            <a:avLst/>
+          </a:prstGeom>
+          <a:solidFill>
+            <a:schemeClr val="tx1"/>
+          </a:solidFill>
+          <a:ln w="3175">
+            <a:noFill/>
+          </a:ln>
+        </p:spPr>
+        <p:style>
+          <a:lnRef idx="2">
+            <a:schemeClr val="accent1">
+              <a:shade val="50000"/>
+            </a:schemeClr>
+          </a:lnRef>
+          <a:fillRef idx="1">
+            <a:schemeClr val="accent1"/>
+          </a:fillRef>
+          <a:effectRef idx="0">
+            <a:schemeClr val="accent1"/>
+          </a:effectRef>
+          <a:fontRef idx="minor">
+            <a:schemeClr val="lt1"/>
+          </a:fontRef>
+        </p:style>
+        <p:txBody>
+          <a:bodyPr rtlCol="0" anchor="ctr"/>
+          <a:lstStyle/>
+          <a:p>
+            <a:pPr algn="ctr"/>
+            <a:r>
+              <a:rPr lang="hu-HU" sz="1600" dirty="0" smtClean="0">
+                <a:solidFill>
+                  <a:schemeClr val="bg1"/>
+                </a:solidFill>
+                <a:latin typeface="Corbel" panose="020B0503020204020204" pitchFamily="34" charset="0"/>
+              </a:rPr>
+              <a:t>Kórház adatok</a:t>
+            </a:r>
+            <a:endParaRPr lang="en-US" sz="1600" dirty="0">
+              <a:solidFill>
+                <a:schemeClr val="bg1"/>
+              </a:solidFill>
+              <a:latin typeface="Corbel" panose="020B0503020204020204" pitchFamily="34" charset="0"/>
+            </a:endParaRPr>
+          </a:p>
+        </p:txBody>
+      </p:sp>
     </p:spTree>
     <p:extLst>
       <p:ext uri="{BB962C8B-B14F-4D97-AF65-F5344CB8AC3E}">
@@ -8592,6 +8724,10 @@
           <a:lstStyle/>
           <a:p>
             <a:pPr algn="ctr"/>
+            <a:r>
+              <a:rPr lang="hu-HU" dirty="0" smtClean="0"/>
+              <a:t>ó</a:t>
+            </a:r>
             <a:endParaRPr lang="en-US" dirty="0"/>
           </a:p>
         </p:txBody>
@@ -10415,7 +10551,7 @@
           <p:nvPr/>
         </p:nvPicPr>
         <p:blipFill>
-          <a:blip r:embed="rId6">
+          <a:blip r:embed="rId6" cstate="hqprint">
             <a:extLst>
               <a:ext uri="{28A0092B-C50C-407E-A947-70E740481C1C}">
                 <a14:useLocalDpi xmlns:a14="http://schemas.microsoft.com/office/drawing/2010/main" val="0"/>
@@ -11363,8 +11499,8 @@
           </a:graphicData>
         </a:graphic>
       </p:graphicFrame>
-      <mc:AlternateContent xmlns:mc="http://schemas.openxmlformats.org/markup-compatibility/2006">
-        <mc:Choice xmlns:p14="http://schemas.microsoft.com/office/powerpoint/2010/main" Requires="p14">
+      <mc:AlternateContent xmlns:mc="http://schemas.openxmlformats.org/markup-compatibility/2006" xmlns:p14="http://schemas.microsoft.com/office/powerpoint/2010/main">
+        <mc:Choice Requires="p14">
           <p:contentPart p14:bwMode="auto" r:id="rId7">
             <p14:nvContentPartPr>
               <p14:cNvPr id="8" name="Szabadkéz 7">
@@ -11383,7 +11519,7 @@
             </p14:xfrm>
           </p:contentPart>
         </mc:Choice>
-        <mc:Fallback>
+        <mc:Fallback xmlns="">
           <p:pic>
             <p:nvPicPr>
               <p:cNvPr id="8" name="Szabadkéz 7">
@@ -11414,8 +11550,8 @@
           </p:pic>
         </mc:Fallback>
       </mc:AlternateContent>
-      <mc:AlternateContent xmlns:mc="http://schemas.openxmlformats.org/markup-compatibility/2006">
-        <mc:Choice xmlns:p14="http://schemas.microsoft.com/office/powerpoint/2010/main" Requires="p14">
+      <mc:AlternateContent xmlns:mc="http://schemas.openxmlformats.org/markup-compatibility/2006" xmlns:p14="http://schemas.microsoft.com/office/powerpoint/2010/main">
+        <mc:Choice Requires="p14">
           <p:contentPart p14:bwMode="auto" r:id="rId9">
             <p14:nvContentPartPr>
               <p14:cNvPr id="9" name="Szabadkéz 8">
@@ -11434,7 +11570,7 @@
             </p14:xfrm>
           </p:contentPart>
         </mc:Choice>
-        <mc:Fallback>
+        <mc:Fallback xmlns="">
           <p:pic>
             <p:nvPicPr>
               <p:cNvPr id="9" name="Szabadkéz 8">
@@ -11465,6 +11601,72 @@
           </p:pic>
         </mc:Fallback>
       </mc:AlternateContent>
+      <p:sp>
+        <p:nvSpPr>
+          <p:cNvPr id="24" name="Téglalap: lekerekített 6">
+            <a:extLst>
+              <a:ext uri="{FF2B5EF4-FFF2-40B4-BE49-F238E27FC236}">
+                <a16:creationId xmlns:a16="http://schemas.microsoft.com/office/drawing/2014/main" id="{1D2B0348-42C5-4CAC-ADE0-3D07B740285F}"/>
+              </a:ext>
+            </a:extLst>
+          </p:cNvPr>
+          <p:cNvSpPr/>
+          <p:nvPr/>
+        </p:nvSpPr>
+        <p:spPr>
+          <a:xfrm>
+            <a:off x="5618632" y="134938"/>
+            <a:ext cx="2192781" cy="378365"/>
+          </a:xfrm>
+          <a:prstGeom prst="roundRect">
+            <a:avLst/>
+          </a:prstGeom>
+          <a:solidFill>
+            <a:schemeClr val="tx1"/>
+          </a:solidFill>
+          <a:ln w="3175">
+            <a:noFill/>
+          </a:ln>
+        </p:spPr>
+        <p:style>
+          <a:lnRef idx="2">
+            <a:schemeClr val="accent1">
+              <a:shade val="50000"/>
+            </a:schemeClr>
+          </a:lnRef>
+          <a:fillRef idx="1">
+            <a:schemeClr val="accent1"/>
+          </a:fillRef>
+          <a:effectRef idx="0">
+            <a:schemeClr val="accent1"/>
+          </a:effectRef>
+          <a:fontRef idx="minor">
+            <a:schemeClr val="lt1"/>
+          </a:fontRef>
+        </p:style>
+        <p:txBody>
+          <a:bodyPr rtlCol="0" anchor="ctr"/>
+          <a:lstStyle/>
+          <a:p>
+            <a:pPr algn="ctr"/>
+            <a:r>
+              <a:rPr lang="hu-HU" sz="1600" dirty="0" smtClean="0">
+                <a:solidFill>
+                  <a:schemeClr val="bg1"/>
+                </a:solidFill>
+                <a:latin typeface="Corbel" panose="020B0503020204020204" pitchFamily="34" charset="0"/>
+              </a:rPr>
+              <a:t>Kórház adatok</a:t>
+            </a:r>
+            <a:endParaRPr lang="en-US" sz="1600" dirty="0">
+              <a:solidFill>
+                <a:schemeClr val="bg1"/>
+              </a:solidFill>
+              <a:latin typeface="Corbel" panose="020B0503020204020204" pitchFamily="34" charset="0"/>
+            </a:endParaRPr>
+          </a:p>
+        </p:txBody>
+      </p:sp>
     </p:spTree>
     <p:extLst>
       <p:ext uri="{BB962C8B-B14F-4D97-AF65-F5344CB8AC3E}">
@@ -12788,7 +12990,7 @@
           <p:nvPr/>
         </p:nvPicPr>
         <p:blipFill>
-          <a:blip r:embed="rId6">
+          <a:blip r:embed="rId6" cstate="hqprint">
             <a:extLst>
               <a:ext uri="{28A0092B-C50C-407E-A947-70E740481C1C}">
                 <a14:useLocalDpi xmlns:a14="http://schemas.microsoft.com/office/drawing/2010/main" val="0"/>
@@ -12809,6 +13011,72 @@
           </a:prstGeom>
         </p:spPr>
       </p:pic>
+      <p:sp>
+        <p:nvSpPr>
+          <p:cNvPr id="26" name="Téglalap: lekerekített 6">
+            <a:extLst>
+              <a:ext uri="{FF2B5EF4-FFF2-40B4-BE49-F238E27FC236}">
+                <a16:creationId xmlns:a16="http://schemas.microsoft.com/office/drawing/2014/main" id="{1D2B0348-42C5-4CAC-ADE0-3D07B740285F}"/>
+              </a:ext>
+            </a:extLst>
+          </p:cNvPr>
+          <p:cNvSpPr/>
+          <p:nvPr/>
+        </p:nvSpPr>
+        <p:spPr>
+          <a:xfrm>
+            <a:off x="5618632" y="134938"/>
+            <a:ext cx="2192781" cy="378365"/>
+          </a:xfrm>
+          <a:prstGeom prst="roundRect">
+            <a:avLst/>
+          </a:prstGeom>
+          <a:solidFill>
+            <a:schemeClr val="tx1"/>
+          </a:solidFill>
+          <a:ln w="3175">
+            <a:noFill/>
+          </a:ln>
+        </p:spPr>
+        <p:style>
+          <a:lnRef idx="2">
+            <a:schemeClr val="accent1">
+              <a:shade val="50000"/>
+            </a:schemeClr>
+          </a:lnRef>
+          <a:fillRef idx="1">
+            <a:schemeClr val="accent1"/>
+          </a:fillRef>
+          <a:effectRef idx="0">
+            <a:schemeClr val="accent1"/>
+          </a:effectRef>
+          <a:fontRef idx="minor">
+            <a:schemeClr val="lt1"/>
+          </a:fontRef>
+        </p:style>
+        <p:txBody>
+          <a:bodyPr rtlCol="0" anchor="ctr"/>
+          <a:lstStyle/>
+          <a:p>
+            <a:pPr algn="ctr"/>
+            <a:r>
+              <a:rPr lang="hu-HU" sz="1600" dirty="0" smtClean="0">
+                <a:solidFill>
+                  <a:schemeClr val="bg1"/>
+                </a:solidFill>
+                <a:latin typeface="Corbel" panose="020B0503020204020204" pitchFamily="34" charset="0"/>
+              </a:rPr>
+              <a:t>Kórház adatok</a:t>
+            </a:r>
+            <a:endParaRPr lang="en-US" sz="1600" dirty="0">
+              <a:solidFill>
+                <a:schemeClr val="bg1"/>
+              </a:solidFill>
+              <a:latin typeface="Corbel" panose="020B0503020204020204" pitchFamily="34" charset="0"/>
+            </a:endParaRPr>
+          </a:p>
+        </p:txBody>
+      </p:sp>
     </p:spTree>
     <p:extLst>
       <p:ext uri="{BB962C8B-B14F-4D97-AF65-F5344CB8AC3E}">

</xml_diff>